<commit_message>
add day 55 to 57
</commit_message>
<xml_diff>
--- a/2nd Semester/MathAnalysis_Day_054 [Summative] Work Day Project (Day 4).pptx
+++ b/2nd Semester/MathAnalysis_Day_054 [Summative] Work Day Project (Day 4).pptx
@@ -205,7 +205,7 @@
           <a:p>
             <a:fld id="{0090E0ED-51A2-4D0E-BDCF-E17571396CEC}" type="datetimeFigureOut">
               <a:rPr lang="en-US" smtClean="0"/>
-              <a:t>2/20/2018</a:t>
+              <a:t>2/21/2018</a:t>
             </a:fld>
             <a:endParaRPr lang="en-US"/>
           </a:p>
@@ -458,7 +458,7 @@
             <a:fld id="{87DE6118-2437-4B30-8E3C-4D2BE6020583}" type="datetimeFigureOut">
               <a:rPr lang="en-US" dirty="0"/>
               <a:pPr/>
-              <a:t>2/20/2018</a:t>
+              <a:t>2/21/2018</a:t>
             </a:fld>
             <a:endParaRPr lang="en-US" dirty="0"/>
           </a:p>
@@ -784,7 +784,7 @@
           <a:p>
             <a:fld id="{87DE6118-2437-4B30-8E3C-4D2BE6020583}" type="datetimeFigureOut">
               <a:rPr lang="en-US" dirty="0"/>
-              <a:t>2/20/2018</a:t>
+              <a:t>2/21/2018</a:t>
             </a:fld>
             <a:endParaRPr lang="en-US" dirty="0"/>
           </a:p>
@@ -959,7 +959,7 @@
           <a:p>
             <a:fld id="{87DE6118-2437-4B30-8E3C-4D2BE6020583}" type="datetimeFigureOut">
               <a:rPr lang="en-US" dirty="0"/>
-              <a:t>2/20/2018</a:t>
+              <a:t>2/21/2018</a:t>
             </a:fld>
             <a:endParaRPr lang="en-US" dirty="0"/>
           </a:p>
@@ -1124,7 +1124,7 @@
           <a:p>
             <a:fld id="{87DE6118-2437-4B30-8E3C-4D2BE6020583}" type="datetimeFigureOut">
               <a:rPr lang="en-US" dirty="0"/>
-              <a:t>2/20/2018</a:t>
+              <a:t>2/21/2018</a:t>
             </a:fld>
             <a:endParaRPr lang="en-US" dirty="0"/>
           </a:p>
@@ -1397,7 +1397,7 @@
             <a:fld id="{87DE6118-2437-4B30-8E3C-4D2BE6020583}" type="datetimeFigureOut">
               <a:rPr lang="en-US" dirty="0"/>
               <a:pPr/>
-              <a:t>2/20/2018</a:t>
+              <a:t>2/21/2018</a:t>
             </a:fld>
             <a:endParaRPr lang="en-US" dirty="0"/>
           </a:p>
@@ -1787,7 +1787,7 @@
           <a:p>
             <a:fld id="{87DE6118-2437-4B30-8E3C-4D2BE6020583}" type="datetimeFigureOut">
               <a:rPr lang="en-US" dirty="0"/>
-              <a:t>2/20/2018</a:t>
+              <a:t>2/21/2018</a:t>
             </a:fld>
             <a:endParaRPr lang="en-US" dirty="0"/>
           </a:p>
@@ -2259,7 +2259,7 @@
           <a:p>
             <a:fld id="{87DE6118-2437-4B30-8E3C-4D2BE6020583}" type="datetimeFigureOut">
               <a:rPr lang="en-US" dirty="0"/>
-              <a:t>2/20/2018</a:t>
+              <a:t>2/21/2018</a:t>
             </a:fld>
             <a:endParaRPr lang="en-US" dirty="0"/>
           </a:p>
@@ -2372,7 +2372,7 @@
           <a:p>
             <a:fld id="{87DE6118-2437-4B30-8E3C-4D2BE6020583}" type="datetimeFigureOut">
               <a:rPr lang="en-US" dirty="0"/>
-              <a:t>2/20/2018</a:t>
+              <a:t>2/21/2018</a:t>
             </a:fld>
             <a:endParaRPr lang="en-US" dirty="0"/>
           </a:p>
@@ -2462,7 +2462,7 @@
           <a:p>
             <a:fld id="{87DE6118-2437-4B30-8E3C-4D2BE6020583}" type="datetimeFigureOut">
               <a:rPr lang="en-US" dirty="0"/>
-              <a:t>2/20/2018</a:t>
+              <a:t>2/21/2018</a:t>
             </a:fld>
             <a:endParaRPr lang="en-US" dirty="0"/>
           </a:p>
@@ -2804,7 +2804,7 @@
             <a:fld id="{87DE6118-2437-4B30-8E3C-4D2BE6020583}" type="datetimeFigureOut">
               <a:rPr lang="en-US" dirty="0"/>
               <a:pPr/>
-              <a:t>2/20/2018</a:t>
+              <a:t>2/21/2018</a:t>
             </a:fld>
             <a:endParaRPr lang="en-US" dirty="0"/>
           </a:p>
@@ -3189,7 +3189,7 @@
             <a:fld id="{87DE6118-2437-4B30-8E3C-4D2BE6020583}" type="datetimeFigureOut">
               <a:rPr lang="en-US" dirty="0"/>
               <a:pPr/>
-              <a:t>2/20/2018</a:t>
+              <a:t>2/21/2018</a:t>
             </a:fld>
             <a:endParaRPr lang="en-US" dirty="0"/>
           </a:p>
@@ -3464,7 +3464,7 @@
             <a:fld id="{87DE6118-2437-4B30-8E3C-4D2BE6020583}" type="datetimeFigureOut">
               <a:rPr lang="en-US" dirty="0"/>
               <a:pPr/>
-              <a:t>2/20/2018</a:t>
+              <a:t>2/21/2018</a:t>
             </a:fld>
             <a:endParaRPr lang="en-US" dirty="0"/>
           </a:p>
@@ -4012,11 +4012,7 @@
           <a:p>
             <a:r>
               <a:rPr lang="en-US" dirty="0" smtClean="0"/>
-              <a:t>Day </a:t>
-            </a:r>
-            <a:r>
-              <a:rPr lang="en-US" dirty="0" smtClean="0"/>
-              <a:t>54</a:t>
+              <a:t>Day 54</a:t>
             </a:r>
             <a:endParaRPr lang="en-US" dirty="0"/>
           </a:p>
@@ -5001,7 +4997,7 @@
             </a:r>
             <a:r>
               <a:rPr lang="en-US" sz="3400" b="1" dirty="0" err="1" smtClean="0"/>
-              <a:t>trell</a:t>
+              <a:t>trello</a:t>
             </a:r>
             <a:endParaRPr lang="en-US" sz="3400" b="1" dirty="0" smtClean="0"/>
           </a:p>
@@ -5115,21 +5111,13 @@
           <a:p>
             <a:r>
               <a:rPr lang="en-US" sz="3400" dirty="0" smtClean="0"/>
-              <a:t>Week 2: </a:t>
-            </a:r>
+              <a:t>Week 2: Begin coding initial functions</a:t>
+            </a:r>
+          </a:p>
+          <a:p>
             <a:r>
               <a:rPr lang="en-US" sz="3400" dirty="0" smtClean="0"/>
-              <a:t>Begin coding initial functions</a:t>
-            </a:r>
-          </a:p>
-          <a:p>
-            <a:r>
-              <a:rPr lang="en-US" sz="3400" dirty="0" smtClean="0"/>
-              <a:t>Week </a:t>
-            </a:r>
-            <a:r>
-              <a:rPr lang="en-US" sz="3400" dirty="0" smtClean="0"/>
-              <a:t>3: </a:t>
+              <a:t>Week 3: </a:t>
             </a:r>
             <a:r>
               <a:rPr lang="en-US" sz="3400" dirty="0"/>
@@ -5287,7 +5275,6 @@
               <a:rPr lang="en-US" sz="3400" dirty="0" smtClean="0"/>
               <a:t>Minor check in today (3-5 minutes to ensure you’ll have something in for your summative)</a:t>
             </a:r>
-            <a:endParaRPr lang="en-US" sz="3400" dirty="0" smtClean="0"/>
           </a:p>
           <a:p>
             <a:r>
@@ -5301,27 +5288,17 @@
               <a:rPr lang="en-US" sz="3400" b="1" i="1" u="sng" dirty="0" smtClean="0"/>
               <a:t>Daily Log two week write up will be due next time!</a:t>
             </a:r>
-            <a:endParaRPr lang="en-US" sz="3400" b="1" i="1" u="sng" dirty="0" smtClean="0"/>
           </a:p>
           <a:p>
             <a:r>
               <a:rPr lang="en-US" sz="3400" dirty="0" smtClean="0"/>
-              <a:t>Specific goals for </a:t>
-            </a:r>
+              <a:t>Specific goals for this week, and next </a:t>
+            </a:r>
+          </a:p>
+          <a:p>
             <a:r>
               <a:rPr lang="en-US" sz="3400" dirty="0" smtClean="0"/>
-              <a:t>this week, and next </a:t>
-            </a:r>
-            <a:endParaRPr lang="en-US" sz="3400" dirty="0" smtClean="0"/>
-          </a:p>
-          <a:p>
-            <a:r>
-              <a:rPr lang="en-US" sz="3400" dirty="0" smtClean="0"/>
-              <a:t>Post your code on </a:t>
-            </a:r>
-            <a:r>
-              <a:rPr lang="en-US" sz="3400" dirty="0" smtClean="0"/>
-              <a:t>TEAMS!!</a:t>
+              <a:t>Post your code on TEAMS!!</a:t>
             </a:r>
             <a:endParaRPr lang="en-US" sz="3400" dirty="0"/>
           </a:p>

</xml_diff>